<commit_message>
async  - more changes
</commit_message>
<xml_diff>
--- a/Modern JavaScript.pptx
+++ b/Modern JavaScript.pptx
@@ -22,7 +22,8 @@
     <p:sldId id="268" r:id="rId16"/>
     <p:sldId id="273" r:id="rId17"/>
     <p:sldId id="275" r:id="rId18"/>
-    <p:sldId id="274" r:id="rId19"/>
+    <p:sldId id="276" r:id="rId19"/>
+    <p:sldId id="277" r:id="rId20"/>
   </p:sldIdLst>
   <p:sldSz cx="12192000" cy="6858000"/>
   <p:notesSz cx="6858000" cy="9144000"/>
@@ -278,7 +279,7 @@
           <a:p>
             <a:fld id="{B0A2E9A4-E1FE-4CEB-8C6E-BF1EDB7D7F2E}" type="datetimeFigureOut">
               <a:rPr lang="en-IN" smtClean="0"/>
-              <a:t>21-02-2020</a:t>
+              <a:t>25/02/20</a:t>
             </a:fld>
             <a:endParaRPr lang="en-IN"/>
           </a:p>
@@ -478,7 +479,7 @@
           <a:p>
             <a:fld id="{B0A2E9A4-E1FE-4CEB-8C6E-BF1EDB7D7F2E}" type="datetimeFigureOut">
               <a:rPr lang="en-IN" smtClean="0"/>
-              <a:t>21-02-2020</a:t>
+              <a:t>25/02/20</a:t>
             </a:fld>
             <a:endParaRPr lang="en-IN"/>
           </a:p>
@@ -688,7 +689,7 @@
           <a:p>
             <a:fld id="{B0A2E9A4-E1FE-4CEB-8C6E-BF1EDB7D7F2E}" type="datetimeFigureOut">
               <a:rPr lang="en-IN" smtClean="0"/>
-              <a:t>21-02-2020</a:t>
+              <a:t>25/02/20</a:t>
             </a:fld>
             <a:endParaRPr lang="en-IN"/>
           </a:p>
@@ -888,7 +889,7 @@
           <a:p>
             <a:fld id="{B0A2E9A4-E1FE-4CEB-8C6E-BF1EDB7D7F2E}" type="datetimeFigureOut">
               <a:rPr lang="en-IN" smtClean="0"/>
-              <a:t>21-02-2020</a:t>
+              <a:t>25/02/20</a:t>
             </a:fld>
             <a:endParaRPr lang="en-IN"/>
           </a:p>
@@ -1164,7 +1165,7 @@
           <a:p>
             <a:fld id="{B0A2E9A4-E1FE-4CEB-8C6E-BF1EDB7D7F2E}" type="datetimeFigureOut">
               <a:rPr lang="en-IN" smtClean="0"/>
-              <a:t>21-02-2020</a:t>
+              <a:t>25/02/20</a:t>
             </a:fld>
             <a:endParaRPr lang="en-IN"/>
           </a:p>
@@ -1432,7 +1433,7 @@
           <a:p>
             <a:fld id="{B0A2E9A4-E1FE-4CEB-8C6E-BF1EDB7D7F2E}" type="datetimeFigureOut">
               <a:rPr lang="en-IN" smtClean="0"/>
-              <a:t>21-02-2020</a:t>
+              <a:t>25/02/20</a:t>
             </a:fld>
             <a:endParaRPr lang="en-IN"/>
           </a:p>
@@ -1847,7 +1848,7 @@
           <a:p>
             <a:fld id="{B0A2E9A4-E1FE-4CEB-8C6E-BF1EDB7D7F2E}" type="datetimeFigureOut">
               <a:rPr lang="en-IN" smtClean="0"/>
-              <a:t>21-02-2020</a:t>
+              <a:t>25/02/20</a:t>
             </a:fld>
             <a:endParaRPr lang="en-IN"/>
           </a:p>
@@ -1989,7 +1990,7 @@
           <a:p>
             <a:fld id="{B0A2E9A4-E1FE-4CEB-8C6E-BF1EDB7D7F2E}" type="datetimeFigureOut">
               <a:rPr lang="en-IN" smtClean="0"/>
-              <a:t>21-02-2020</a:t>
+              <a:t>25/02/20</a:t>
             </a:fld>
             <a:endParaRPr lang="en-IN"/>
           </a:p>
@@ -2102,7 +2103,7 @@
           <a:p>
             <a:fld id="{B0A2E9A4-E1FE-4CEB-8C6E-BF1EDB7D7F2E}" type="datetimeFigureOut">
               <a:rPr lang="en-IN" smtClean="0"/>
-              <a:t>21-02-2020</a:t>
+              <a:t>25/02/20</a:t>
             </a:fld>
             <a:endParaRPr lang="en-IN"/>
           </a:p>
@@ -2415,7 +2416,7 @@
           <a:p>
             <a:fld id="{B0A2E9A4-E1FE-4CEB-8C6E-BF1EDB7D7F2E}" type="datetimeFigureOut">
               <a:rPr lang="en-IN" smtClean="0"/>
-              <a:t>21-02-2020</a:t>
+              <a:t>25/02/20</a:t>
             </a:fld>
             <a:endParaRPr lang="en-IN"/>
           </a:p>
@@ -2704,7 +2705,7 @@
           <a:p>
             <a:fld id="{B0A2E9A4-E1FE-4CEB-8C6E-BF1EDB7D7F2E}" type="datetimeFigureOut">
               <a:rPr lang="en-IN" smtClean="0"/>
-              <a:t>21-02-2020</a:t>
+              <a:t>25/02/20</a:t>
             </a:fld>
             <a:endParaRPr lang="en-IN"/>
           </a:p>
@@ -2947,7 +2948,7 @@
           <a:p>
             <a:fld id="{B0A2E9A4-E1FE-4CEB-8C6E-BF1EDB7D7F2E}" type="datetimeFigureOut">
               <a:rPr lang="en-IN" smtClean="0"/>
-              <a:t>21-02-2020</a:t>
+              <a:t>25/02/20</a:t>
             </a:fld>
             <a:endParaRPr lang="en-IN"/>
           </a:p>
@@ -7102,6 +7103,14 @@
 <file path=ppt/slides/slide18.xml><?xml version="1.0" encoding="utf-8"?>
 <p:sld xmlns:a="http://schemas.openxmlformats.org/drawingml/2006/main" xmlns:r="http://schemas.openxmlformats.org/officeDocument/2006/relationships" xmlns:p="http://schemas.openxmlformats.org/presentationml/2006/main">
   <p:cSld>
+    <p:bg>
+      <p:bgPr>
+        <a:solidFill>
+          <a:schemeClr val="bg1"/>
+        </a:solidFill>
+        <a:effectLst/>
+      </p:bgPr>
+    </p:bg>
     <p:spTree>
       <p:nvGrpSpPr>
         <p:cNvPr id="1" name=""/>
@@ -7118,10 +7127,378 @@
       </p:grpSpPr>
       <p:sp>
         <p:nvSpPr>
+          <p:cNvPr id="8" name="Rectangle 7">
+            <a:extLst>
+              <a:ext uri="{FF2B5EF4-FFF2-40B4-BE49-F238E27FC236}">
+                <a16:creationId xmlns:a16="http://schemas.microsoft.com/office/drawing/2014/main" id="{EA67B5B4-3A24-436E-B663-1B2EBFF8A0CD}"/>
+              </a:ext>
+              <a:ext uri="{C183D7F6-B498-43B3-948B-1728B52AA6E4}">
+                <adec:decorative xmlns:adec="http://schemas.microsoft.com/office/drawing/2017/decorative" val="1"/>
+              </a:ext>
+            </a:extLst>
+          </p:cNvPr>
+          <p:cNvSpPr>
+            <a:spLocks noGrp="1" noRot="1" noChangeAspect="1" noMove="1" noResize="1" noEditPoints="1" noAdjustHandles="1" noChangeArrowheads="1" noChangeShapeType="1" noTextEdit="1"/>
+          </p:cNvSpPr>
+          <p:nvPr>
+            <p:extLst>
+              <p:ext uri="{386F3935-93C4-4BCD-93E2-E3B085C9AB24}">
+                <p16:designElem xmlns:p16="http://schemas.microsoft.com/office/powerpoint/2015/main" val="1"/>
+              </p:ext>
+            </p:extLst>
+          </p:nvPr>
+        </p:nvSpPr>
+        <p:spPr>
+          <a:xfrm>
+            <a:off x="0" y="-3324"/>
+            <a:ext cx="12192000" cy="6861324"/>
+          </a:xfrm>
+          <a:prstGeom prst="rect">
+            <a:avLst/>
+          </a:prstGeom>
+          <a:solidFill>
+            <a:srgbClr val="404040"/>
+          </a:solidFill>
+          <a:ln>
+            <a:noFill/>
+          </a:ln>
+        </p:spPr>
+        <p:style>
+          <a:lnRef idx="2">
+            <a:schemeClr val="accent1">
+              <a:shade val="50000"/>
+            </a:schemeClr>
+          </a:lnRef>
+          <a:fillRef idx="1">
+            <a:schemeClr val="accent1"/>
+          </a:fillRef>
+          <a:effectRef idx="0">
+            <a:schemeClr val="accent1"/>
+          </a:effectRef>
+          <a:fontRef idx="minor">
+            <a:schemeClr val="lt1"/>
+          </a:fontRef>
+        </p:style>
+        <p:txBody>
+          <a:bodyPr rtlCol="0" anchor="ctr"/>
+          <a:lstStyle/>
+          <a:p>
+            <a:pPr marL="0" marR="0" lvl="0" indent="0" algn="ctr" defTabSz="914400" rtl="0" eaLnBrk="1" fontAlgn="auto" latinLnBrk="0" hangingPunct="1">
+              <a:lnSpc>
+                <a:spcPct val="100000"/>
+              </a:lnSpc>
+              <a:spcBef>
+                <a:spcPts val="0"/>
+              </a:spcBef>
+              <a:spcAft>
+                <a:spcPts val="0"/>
+              </a:spcAft>
+              <a:buClrTx/>
+              <a:buSzTx/>
+              <a:buFontTx/>
+              <a:buNone/>
+              <a:tabLst/>
+              <a:defRPr/>
+            </a:pPr>
+            <a:endParaRPr kumimoji="0" lang="en-US" sz="1800" b="0" i="0" u="none" strike="noStrike" kern="1200" cap="none" spc="0" normalizeH="0" baseline="0" noProof="0">
+              <a:ln>
+                <a:noFill/>
+              </a:ln>
+              <a:solidFill>
+                <a:prstClr val="white"/>
+              </a:solidFill>
+              <a:effectLst/>
+              <a:uLnTx/>
+              <a:uFillTx/>
+              <a:latin typeface="Calibri" panose="020F0502020204030204"/>
+              <a:ea typeface="+mn-ea"/>
+              <a:cs typeface="+mn-cs"/>
+            </a:endParaRPr>
+          </a:p>
+        </p:txBody>
+      </p:sp>
+      <p:sp>
+        <p:nvSpPr>
+          <p:cNvPr id="10" name="Freeform 13">
+            <a:extLst>
+              <a:ext uri="{FF2B5EF4-FFF2-40B4-BE49-F238E27FC236}">
+                <a16:creationId xmlns:a16="http://schemas.microsoft.com/office/drawing/2014/main" id="{987FDF89-C993-41F4-A1B8-DBAFF16008A9}"/>
+              </a:ext>
+              <a:ext uri="{C183D7F6-B498-43B3-948B-1728B52AA6E4}">
+                <adec:decorative xmlns:adec="http://schemas.microsoft.com/office/drawing/2017/decorative" val="1"/>
+              </a:ext>
+            </a:extLst>
+          </p:cNvPr>
+          <p:cNvSpPr>
+            <a:spLocks noGrp="1" noRot="1" noChangeAspect="1" noMove="1" noResize="1" noEditPoints="1" noAdjustHandles="1" noChangeArrowheads="1" noChangeShapeType="1" noTextEdit="1"/>
+          </p:cNvSpPr>
+          <p:nvPr>
+            <p:extLst>
+              <p:ext uri="{386F3935-93C4-4BCD-93E2-E3B085C9AB24}">
+                <p16:designElem xmlns:p16="http://schemas.microsoft.com/office/powerpoint/2015/main" val="1"/>
+              </p:ext>
+            </p:extLst>
+          </p:nvPr>
+        </p:nvSpPr>
+        <p:spPr>
+          <a:xfrm>
+            <a:off x="0" y="0"/>
+            <a:ext cx="11960028" cy="6858000"/>
+          </a:xfrm>
+          <a:custGeom>
+            <a:avLst/>
+            <a:gdLst>
+              <a:gd name="connsiteX0" fmla="*/ 0 w 11786754"/>
+              <a:gd name="connsiteY0" fmla="*/ 0 h 6858000"/>
+              <a:gd name="connsiteX1" fmla="*/ 8610600 w 11786754"/>
+              <a:gd name="connsiteY1" fmla="*/ 0 h 6858000"/>
+              <a:gd name="connsiteX2" fmla="*/ 11786754 w 11786754"/>
+              <a:gd name="connsiteY2" fmla="*/ 6858000 h 6858000"/>
+              <a:gd name="connsiteX3" fmla="*/ 0 w 11786754"/>
+              <a:gd name="connsiteY3" fmla="*/ 6858000 h 6858000"/>
+            </a:gdLst>
+            <a:ahLst/>
+            <a:cxnLst>
+              <a:cxn ang="0">
+                <a:pos x="connsiteX0" y="connsiteY0"/>
+              </a:cxn>
+              <a:cxn ang="0">
+                <a:pos x="connsiteX1" y="connsiteY1"/>
+              </a:cxn>
+              <a:cxn ang="0">
+                <a:pos x="connsiteX2" y="connsiteY2"/>
+              </a:cxn>
+              <a:cxn ang="0">
+                <a:pos x="connsiteX3" y="connsiteY3"/>
+              </a:cxn>
+            </a:cxnLst>
+            <a:rect l="l" t="t" r="r" b="b"/>
+            <a:pathLst>
+              <a:path w="11786754" h="6858000">
+                <a:moveTo>
+                  <a:pt x="0" y="0"/>
+                </a:moveTo>
+                <a:lnTo>
+                  <a:pt x="8610600" y="0"/>
+                </a:lnTo>
+                <a:lnTo>
+                  <a:pt x="11786754" y="6858000"/>
+                </a:lnTo>
+                <a:lnTo>
+                  <a:pt x="0" y="6858000"/>
+                </a:lnTo>
+                <a:close/>
+              </a:path>
+            </a:pathLst>
+          </a:custGeom>
+          <a:solidFill>
+            <a:srgbClr val="000000">
+              <a:alpha val="29804"/>
+            </a:srgbClr>
+          </a:solidFill>
+          <a:ln>
+            <a:noFill/>
+          </a:ln>
+        </p:spPr>
+        <p:style>
+          <a:lnRef idx="2">
+            <a:schemeClr val="accent1">
+              <a:shade val="50000"/>
+            </a:schemeClr>
+          </a:lnRef>
+          <a:fillRef idx="1">
+            <a:schemeClr val="accent1"/>
+          </a:fillRef>
+          <a:effectRef idx="0">
+            <a:schemeClr val="accent1"/>
+          </a:effectRef>
+          <a:fontRef idx="minor">
+            <a:schemeClr val="lt1"/>
+          </a:fontRef>
+        </p:style>
+        <p:txBody>
+          <a:bodyPr rtlCol="0" anchor="ctr"/>
+          <a:lstStyle/>
+          <a:p>
+            <a:pPr marL="0" marR="0" lvl="0" indent="0" algn="ctr" defTabSz="914400" rtl="0" eaLnBrk="1" fontAlgn="auto" latinLnBrk="0" hangingPunct="1">
+              <a:lnSpc>
+                <a:spcPct val="100000"/>
+              </a:lnSpc>
+              <a:spcBef>
+                <a:spcPts val="0"/>
+              </a:spcBef>
+              <a:spcAft>
+                <a:spcPts val="0"/>
+              </a:spcAft>
+              <a:buClrTx/>
+              <a:buSzTx/>
+              <a:buFontTx/>
+              <a:buNone/>
+              <a:tabLst/>
+              <a:defRPr/>
+            </a:pPr>
+            <a:endParaRPr kumimoji="0" lang="en-US" sz="1800" b="0" i="0" u="none" strike="noStrike" kern="1200" cap="none" spc="0" normalizeH="0" baseline="0" noProof="0">
+              <a:ln>
+                <a:noFill/>
+              </a:ln>
+              <a:solidFill>
+                <a:prstClr val="white"/>
+              </a:solidFill>
+              <a:effectLst/>
+              <a:uLnTx/>
+              <a:uFillTx/>
+              <a:latin typeface="Calibri" panose="020F0502020204030204"/>
+              <a:ea typeface="+mn-ea"/>
+              <a:cs typeface="+mn-cs"/>
+            </a:endParaRPr>
+          </a:p>
+        </p:txBody>
+      </p:sp>
+      <p:sp>
+        <p:nvSpPr>
+          <p:cNvPr id="12" name="Freeform: Shape 11">
+            <a:extLst>
+              <a:ext uri="{FF2B5EF4-FFF2-40B4-BE49-F238E27FC236}">
+                <a16:creationId xmlns:a16="http://schemas.microsoft.com/office/drawing/2014/main" id="{9FA64B84-CE2D-4179-B018-A71AC174C71C}"/>
+              </a:ext>
+              <a:ext uri="{C183D7F6-B498-43B3-948B-1728B52AA6E4}">
+                <adec:decorative xmlns:adec="http://schemas.microsoft.com/office/drawing/2017/decorative" val="1"/>
+              </a:ext>
+            </a:extLst>
+          </p:cNvPr>
+          <p:cNvSpPr>
+            <a:spLocks noGrp="1" noRot="1" noChangeAspect="1" noMove="1" noResize="1" noEditPoints="1" noAdjustHandles="1" noChangeArrowheads="1" noChangeShapeType="1" noTextEdit="1"/>
+          </p:cNvSpPr>
+          <p:nvPr>
+            <p:extLst>
+              <p:ext uri="{386F3935-93C4-4BCD-93E2-E3B085C9AB24}">
+                <p16:designElem xmlns:p16="http://schemas.microsoft.com/office/powerpoint/2015/main" val="1"/>
+              </p:ext>
+            </p:extLst>
+          </p:nvPr>
+        </p:nvSpPr>
+        <p:spPr>
+          <a:xfrm>
+            <a:off x="0" y="0"/>
+            <a:ext cx="3459632" cy="6858000"/>
+          </a:xfrm>
+          <a:custGeom>
+            <a:avLst/>
+            <a:gdLst>
+              <a:gd name="connsiteX0" fmla="*/ 0 w 3459632"/>
+              <a:gd name="connsiteY0" fmla="*/ 0 h 6858000"/>
+              <a:gd name="connsiteX1" fmla="*/ 283478 w 3459632"/>
+              <a:gd name="connsiteY1" fmla="*/ 0 h 6858000"/>
+              <a:gd name="connsiteX2" fmla="*/ 3459632 w 3459632"/>
+              <a:gd name="connsiteY2" fmla="*/ 6858000 h 6858000"/>
+              <a:gd name="connsiteX3" fmla="*/ 0 w 3459632"/>
+              <a:gd name="connsiteY3" fmla="*/ 6858000 h 6858000"/>
+            </a:gdLst>
+            <a:ahLst/>
+            <a:cxnLst>
+              <a:cxn ang="0">
+                <a:pos x="connsiteX0" y="connsiteY0"/>
+              </a:cxn>
+              <a:cxn ang="0">
+                <a:pos x="connsiteX1" y="connsiteY1"/>
+              </a:cxn>
+              <a:cxn ang="0">
+                <a:pos x="connsiteX2" y="connsiteY2"/>
+              </a:cxn>
+              <a:cxn ang="0">
+                <a:pos x="connsiteX3" y="connsiteY3"/>
+              </a:cxn>
+            </a:cxnLst>
+            <a:rect l="l" t="t" r="r" b="b"/>
+            <a:pathLst>
+              <a:path w="3459632" h="6858000">
+                <a:moveTo>
+                  <a:pt x="0" y="0"/>
+                </a:moveTo>
+                <a:lnTo>
+                  <a:pt x="283478" y="0"/>
+                </a:lnTo>
+                <a:lnTo>
+                  <a:pt x="3459632" y="6858000"/>
+                </a:lnTo>
+                <a:lnTo>
+                  <a:pt x="0" y="6858000"/>
+                </a:lnTo>
+                <a:close/>
+              </a:path>
+            </a:pathLst>
+          </a:custGeom>
+          <a:solidFill>
+            <a:srgbClr val="000000">
+              <a:alpha val="29804"/>
+            </a:srgbClr>
+          </a:solidFill>
+          <a:ln>
+            <a:noFill/>
+          </a:ln>
+        </p:spPr>
+        <p:style>
+          <a:lnRef idx="2">
+            <a:schemeClr val="accent1">
+              <a:shade val="50000"/>
+            </a:schemeClr>
+          </a:lnRef>
+          <a:fillRef idx="1">
+            <a:schemeClr val="accent1"/>
+          </a:fillRef>
+          <a:effectRef idx="0">
+            <a:schemeClr val="accent1"/>
+          </a:effectRef>
+          <a:fontRef idx="minor">
+            <a:schemeClr val="lt1"/>
+          </a:fontRef>
+        </p:style>
+        <p:txBody>
+          <a:bodyPr wrap="square" rtlCol="0" anchor="ctr">
+            <a:noAutofit/>
+          </a:bodyPr>
+          <a:lstStyle/>
+          <a:p>
+            <a:pPr marL="0" marR="0" lvl="0" indent="0" algn="ctr" defTabSz="914400" rtl="0" eaLnBrk="1" fontAlgn="auto" latinLnBrk="0" hangingPunct="1">
+              <a:lnSpc>
+                <a:spcPct val="100000"/>
+              </a:lnSpc>
+              <a:spcBef>
+                <a:spcPts val="0"/>
+              </a:spcBef>
+              <a:spcAft>
+                <a:spcPts val="0"/>
+              </a:spcAft>
+              <a:buClrTx/>
+              <a:buSzTx/>
+              <a:buFontTx/>
+              <a:buNone/>
+              <a:tabLst/>
+              <a:defRPr/>
+            </a:pPr>
+            <a:endParaRPr kumimoji="0" lang="en-US" sz="1800" b="0" i="0" u="none" strike="noStrike" kern="1200" cap="none" spc="0" normalizeH="0" baseline="0" noProof="0">
+              <a:ln>
+                <a:noFill/>
+              </a:ln>
+              <a:solidFill>
+                <a:prstClr val="white"/>
+              </a:solidFill>
+              <a:effectLst/>
+              <a:uLnTx/>
+              <a:uFillTx/>
+              <a:latin typeface="Calibri" panose="020F0502020204030204"/>
+              <a:ea typeface="+mn-ea"/>
+              <a:cs typeface="+mn-cs"/>
+            </a:endParaRPr>
+          </a:p>
+        </p:txBody>
+      </p:sp>
+      <p:sp>
+        <p:nvSpPr>
           <p:cNvPr id="2" name="Title 1">
             <a:extLst>
               <a:ext uri="{FF2B5EF4-FFF2-40B4-BE49-F238E27FC236}">
-                <a16:creationId xmlns:a16="http://schemas.microsoft.com/office/drawing/2014/main" id="{5705C2D9-12ED-4385-B9A1-E4D7978966DB}"/>
+                <a16:creationId xmlns:a16="http://schemas.microsoft.com/office/drawing/2014/main" id="{6599601C-081B-4C5C-99AD-A3BC432AE29C}"/>
               </a:ext>
             </a:extLst>
           </p:cNvPr>
@@ -7132,16 +7509,99 @@
             <p:ph type="title"/>
           </p:nvPr>
         </p:nvSpPr>
-        <p:spPr/>
-        <p:txBody>
-          <a:bodyPr/>
+        <p:spPr>
+          <a:xfrm>
+            <a:off x="3111963" y="0"/>
+            <a:ext cx="5968074" cy="949593"/>
+          </a:xfrm>
+        </p:spPr>
+        <p:txBody>
+          <a:bodyPr>
+            <a:normAutofit/>
+          </a:bodyPr>
           <a:lstStyle/>
           <a:p>
             <a:r>
-              <a:rPr lang="en-IN" dirty="0" err="1"/>
-              <a:t>Callbacks</a:t>
-            </a:r>
-            <a:endParaRPr lang="en-IN" dirty="0"/>
+              <a:rPr lang="en-IN" dirty="0">
+                <a:solidFill>
+                  <a:srgbClr val="FFFFFF"/>
+                </a:solidFill>
+              </a:rPr>
+              <a:t>Promises</a:t>
+            </a:r>
+          </a:p>
+        </p:txBody>
+      </p:sp>
+      <p:sp>
+        <p:nvSpPr>
+          <p:cNvPr id="14" name="TextBox 13">
+            <a:extLst>
+              <a:ext uri="{FF2B5EF4-FFF2-40B4-BE49-F238E27FC236}">
+                <a16:creationId xmlns:a16="http://schemas.microsoft.com/office/drawing/2014/main" id="{4795A2E2-224B-4FA0-B323-9E61AD30697F}"/>
+              </a:ext>
+              <a:ext uri="{C183D7F6-B498-43B3-948B-1728B52AA6E4}">
+                <adec:decorative xmlns:adec="http://schemas.microsoft.com/office/drawing/2017/decorative" val="1"/>
+              </a:ext>
+            </a:extLst>
+          </p:cNvPr>
+          <p:cNvSpPr txBox="1">
+            <a:spLocks noGrp="1" noRot="1" noChangeAspect="1" noMove="1" noResize="1" noEditPoints="1" noAdjustHandles="1" noChangeArrowheads="1" noChangeShapeType="1" noTextEdit="1"/>
+          </p:cNvSpPr>
+          <p:nvPr>
+            <p:extLst>
+              <p:ext uri="{386F3935-93C4-4BCD-93E2-E3B085C9AB24}">
+                <p16:designElem xmlns:p16="http://schemas.microsoft.com/office/powerpoint/2015/main" val="1"/>
+              </p:ext>
+            </p:extLst>
+          </p:nvPr>
+        </p:nvSpPr>
+        <p:spPr>
+          <a:xfrm>
+            <a:off x="833002" y="1870075"/>
+            <a:ext cx="9612178" cy="595651"/>
+          </a:xfrm>
+          <a:prstGeom prst="rect">
+            <a:avLst/>
+          </a:prstGeom>
+          <a:noFill/>
+        </p:spPr>
+        <p:txBody>
+          <a:bodyPr wrap="square" rtlCol="0" anchor="t">
+            <a:normAutofit/>
+          </a:bodyPr>
+          <a:lstStyle/>
+          <a:p>
+            <a:pPr marL="0" marR="0" lvl="0" indent="0" algn="l" defTabSz="914400" rtl="0" eaLnBrk="1" fontAlgn="auto" latinLnBrk="0" hangingPunct="1">
+              <a:lnSpc>
+                <a:spcPct val="120000"/>
+              </a:lnSpc>
+              <a:spcBef>
+                <a:spcPts val="0"/>
+              </a:spcBef>
+              <a:spcAft>
+                <a:spcPts val="0"/>
+              </a:spcAft>
+              <a:buClrTx/>
+              <a:buSzTx/>
+              <a:buFontTx/>
+              <a:buNone/>
+              <a:tabLst/>
+              <a:defRPr/>
+            </a:pPr>
+            <a:endParaRPr kumimoji="0" lang="en-US" sz="2000" b="0" i="0" u="none" strike="noStrike" kern="1200" cap="none" spc="0" normalizeH="0" baseline="0" noProof="0" dirty="0">
+              <a:ln>
+                <a:noFill/>
+              </a:ln>
+              <a:solidFill>
+                <a:srgbClr val="FFC000"/>
+              </a:solidFill>
+              <a:effectLst/>
+              <a:uLnTx/>
+              <a:uFillTx/>
+              <a:latin typeface="Calibri" panose="020F0502020204030204"/>
+              <a:ea typeface="+mn-ea"/>
+              <a:cs typeface="+mn-cs"/>
+            </a:endParaRPr>
           </a:p>
         </p:txBody>
       </p:sp>
@@ -7150,7 +7610,7 @@
           <p:cNvPr id="3" name="Content Placeholder 2">
             <a:extLst>
               <a:ext uri="{FF2B5EF4-FFF2-40B4-BE49-F238E27FC236}">
-                <a16:creationId xmlns:a16="http://schemas.microsoft.com/office/drawing/2014/main" id="{0FFE5FCD-BC34-4A2C-A440-1E42E65B05DF}"/>
+                <a16:creationId xmlns:a16="http://schemas.microsoft.com/office/drawing/2014/main" id="{37F319FF-7163-4F0F-AB17-3B32BC09CC75}"/>
               </a:ext>
             </a:extLst>
           </p:cNvPr>
@@ -7161,36 +7621,659 @@
             <p:ph idx="1"/>
           </p:nvPr>
         </p:nvSpPr>
-        <p:spPr/>
-        <p:txBody>
-          <a:bodyPr/>
+        <p:spPr>
+          <a:xfrm>
+            <a:off x="1746820" y="1787792"/>
+            <a:ext cx="7331769" cy="4784457"/>
+          </a:xfrm>
+        </p:spPr>
+        <p:txBody>
+          <a:bodyPr>
+            <a:normAutofit/>
+          </a:bodyPr>
           <a:lstStyle/>
           <a:p>
-            <a:r>
-              <a:rPr lang="en-US" i="1" dirty="0"/>
-              <a:t>A callback is a function that is to be executed </a:t>
-            </a:r>
-            <a:r>
-              <a:rPr lang="en-US" b="1" i="1" dirty="0"/>
-              <a:t>after</a:t>
-            </a:r>
-            <a:r>
-              <a:rPr lang="en-US" i="1" dirty="0"/>
-              <a:t> another function has finished executing — hence the name ‘call back’</a:t>
-            </a:r>
-            <a:endParaRPr lang="en-IN" dirty="0"/>
+            <a:pPr marL="0" indent="0">
+              <a:buNone/>
+            </a:pPr>
+            <a:endParaRPr lang="en-IN" sz="1800" dirty="0">
+              <a:solidFill>
+                <a:srgbClr val="FFFFFF"/>
+              </a:solidFill>
+            </a:endParaRPr>
+          </a:p>
+          <a:p>
+            <a:r>
+              <a:rPr lang="en-IN" sz="1800" dirty="0">
+                <a:solidFill>
+                  <a:srgbClr val="FFFFFF"/>
+                </a:solidFill>
+              </a:rPr>
+              <a:t>Promises</a:t>
+            </a:r>
+          </a:p>
+          <a:p>
+            <a:endParaRPr lang="en-IN" sz="1800" dirty="0">
+              <a:solidFill>
+                <a:srgbClr val="FFFFFF"/>
+              </a:solidFill>
+            </a:endParaRPr>
           </a:p>
         </p:txBody>
       </p:sp>
     </p:spTree>
     <p:extLst>
       <p:ext uri="{BB962C8B-B14F-4D97-AF65-F5344CB8AC3E}">
-        <p14:creationId xmlns:p14="http://schemas.microsoft.com/office/powerpoint/2010/main" val="432615231"/>
+        <p14:creationId xmlns:p14="http://schemas.microsoft.com/office/powerpoint/2010/main" val="1538051281"/>
       </p:ext>
     </p:extLst>
   </p:cSld>
   <p:clrMapOvr>
-    <a:masterClrMapping/>
+    <a:overrideClrMapping bg1="dk1" tx1="lt1" bg2="dk2" tx2="lt2" accent1="accent1" accent2="accent2" accent3="accent3" accent4="accent4" accent5="accent5" accent6="accent6" hlink="hlink" folHlink="folHlink"/>
+  </p:clrMapOvr>
+</p:sld>
+</file>
+
+<file path=ppt/slides/slide19.xml><?xml version="1.0" encoding="utf-8"?>
+<p:sld xmlns:a="http://schemas.openxmlformats.org/drawingml/2006/main" xmlns:r="http://schemas.openxmlformats.org/officeDocument/2006/relationships" xmlns:p="http://schemas.openxmlformats.org/presentationml/2006/main">
+  <p:cSld>
+    <p:bg>
+      <p:bgPr>
+        <a:solidFill>
+          <a:schemeClr val="bg1"/>
+        </a:solidFill>
+        <a:effectLst/>
+      </p:bgPr>
+    </p:bg>
+    <p:spTree>
+      <p:nvGrpSpPr>
+        <p:cNvPr id="1" name=""/>
+        <p:cNvGrpSpPr/>
+        <p:nvPr/>
+      </p:nvGrpSpPr>
+      <p:grpSpPr>
+        <a:xfrm>
+          <a:off x="0" y="0"/>
+          <a:ext cx="0" cy="0"/>
+          <a:chOff x="0" y="0"/>
+          <a:chExt cx="0" cy="0"/>
+        </a:xfrm>
+      </p:grpSpPr>
+      <p:sp>
+        <p:nvSpPr>
+          <p:cNvPr id="8" name="Rectangle 7">
+            <a:extLst>
+              <a:ext uri="{FF2B5EF4-FFF2-40B4-BE49-F238E27FC236}">
+                <a16:creationId xmlns:a16="http://schemas.microsoft.com/office/drawing/2014/main" id="{EA67B5B4-3A24-436E-B663-1B2EBFF8A0CD}"/>
+              </a:ext>
+              <a:ext uri="{C183D7F6-B498-43B3-948B-1728B52AA6E4}">
+                <adec:decorative xmlns:adec="http://schemas.microsoft.com/office/drawing/2017/decorative" val="1"/>
+              </a:ext>
+            </a:extLst>
+          </p:cNvPr>
+          <p:cNvSpPr>
+            <a:spLocks noGrp="1" noRot="1" noChangeAspect="1" noMove="1" noResize="1" noEditPoints="1" noAdjustHandles="1" noChangeArrowheads="1" noChangeShapeType="1" noTextEdit="1"/>
+          </p:cNvSpPr>
+          <p:nvPr>
+            <p:extLst>
+              <p:ext uri="{386F3935-93C4-4BCD-93E2-E3B085C9AB24}">
+                <p16:designElem xmlns:p16="http://schemas.microsoft.com/office/powerpoint/2015/main" val="1"/>
+              </p:ext>
+            </p:extLst>
+          </p:nvPr>
+        </p:nvSpPr>
+        <p:spPr>
+          <a:xfrm>
+            <a:off x="0" y="-3324"/>
+            <a:ext cx="12192000" cy="6861324"/>
+          </a:xfrm>
+          <a:prstGeom prst="rect">
+            <a:avLst/>
+          </a:prstGeom>
+          <a:solidFill>
+            <a:srgbClr val="404040"/>
+          </a:solidFill>
+          <a:ln>
+            <a:noFill/>
+          </a:ln>
+        </p:spPr>
+        <p:style>
+          <a:lnRef idx="2">
+            <a:schemeClr val="accent1">
+              <a:shade val="50000"/>
+            </a:schemeClr>
+          </a:lnRef>
+          <a:fillRef idx="1">
+            <a:schemeClr val="accent1"/>
+          </a:fillRef>
+          <a:effectRef idx="0">
+            <a:schemeClr val="accent1"/>
+          </a:effectRef>
+          <a:fontRef idx="minor">
+            <a:schemeClr val="lt1"/>
+          </a:fontRef>
+        </p:style>
+        <p:txBody>
+          <a:bodyPr rtlCol="0" anchor="ctr"/>
+          <a:lstStyle/>
+          <a:p>
+            <a:pPr marL="0" marR="0" lvl="0" indent="0" algn="ctr" defTabSz="914400" rtl="0" eaLnBrk="1" fontAlgn="auto" latinLnBrk="0" hangingPunct="1">
+              <a:lnSpc>
+                <a:spcPct val="100000"/>
+              </a:lnSpc>
+              <a:spcBef>
+                <a:spcPts val="0"/>
+              </a:spcBef>
+              <a:spcAft>
+                <a:spcPts val="0"/>
+              </a:spcAft>
+              <a:buClrTx/>
+              <a:buSzTx/>
+              <a:buFontTx/>
+              <a:buNone/>
+              <a:tabLst/>
+              <a:defRPr/>
+            </a:pPr>
+            <a:endParaRPr kumimoji="0" lang="en-US" sz="1800" b="0" i="0" u="none" strike="noStrike" kern="1200" cap="none" spc="0" normalizeH="0" baseline="0" noProof="0">
+              <a:ln>
+                <a:noFill/>
+              </a:ln>
+              <a:solidFill>
+                <a:prstClr val="white"/>
+              </a:solidFill>
+              <a:effectLst/>
+              <a:uLnTx/>
+              <a:uFillTx/>
+              <a:latin typeface="Calibri" panose="020F0502020204030204"/>
+              <a:ea typeface="+mn-ea"/>
+              <a:cs typeface="+mn-cs"/>
+            </a:endParaRPr>
+          </a:p>
+        </p:txBody>
+      </p:sp>
+      <p:sp>
+        <p:nvSpPr>
+          <p:cNvPr id="10" name="Freeform 13">
+            <a:extLst>
+              <a:ext uri="{FF2B5EF4-FFF2-40B4-BE49-F238E27FC236}">
+                <a16:creationId xmlns:a16="http://schemas.microsoft.com/office/drawing/2014/main" id="{987FDF89-C993-41F4-A1B8-DBAFF16008A9}"/>
+              </a:ext>
+              <a:ext uri="{C183D7F6-B498-43B3-948B-1728B52AA6E4}">
+                <adec:decorative xmlns:adec="http://schemas.microsoft.com/office/drawing/2017/decorative" val="1"/>
+              </a:ext>
+            </a:extLst>
+          </p:cNvPr>
+          <p:cNvSpPr>
+            <a:spLocks noGrp="1" noRot="1" noChangeAspect="1" noMove="1" noResize="1" noEditPoints="1" noAdjustHandles="1" noChangeArrowheads="1" noChangeShapeType="1" noTextEdit="1"/>
+          </p:cNvSpPr>
+          <p:nvPr>
+            <p:extLst>
+              <p:ext uri="{386F3935-93C4-4BCD-93E2-E3B085C9AB24}">
+                <p16:designElem xmlns:p16="http://schemas.microsoft.com/office/powerpoint/2015/main" val="1"/>
+              </p:ext>
+            </p:extLst>
+          </p:nvPr>
+        </p:nvSpPr>
+        <p:spPr>
+          <a:xfrm>
+            <a:off x="0" y="0"/>
+            <a:ext cx="11960028" cy="6858000"/>
+          </a:xfrm>
+          <a:custGeom>
+            <a:avLst/>
+            <a:gdLst>
+              <a:gd name="connsiteX0" fmla="*/ 0 w 11786754"/>
+              <a:gd name="connsiteY0" fmla="*/ 0 h 6858000"/>
+              <a:gd name="connsiteX1" fmla="*/ 8610600 w 11786754"/>
+              <a:gd name="connsiteY1" fmla="*/ 0 h 6858000"/>
+              <a:gd name="connsiteX2" fmla="*/ 11786754 w 11786754"/>
+              <a:gd name="connsiteY2" fmla="*/ 6858000 h 6858000"/>
+              <a:gd name="connsiteX3" fmla="*/ 0 w 11786754"/>
+              <a:gd name="connsiteY3" fmla="*/ 6858000 h 6858000"/>
+            </a:gdLst>
+            <a:ahLst/>
+            <a:cxnLst>
+              <a:cxn ang="0">
+                <a:pos x="connsiteX0" y="connsiteY0"/>
+              </a:cxn>
+              <a:cxn ang="0">
+                <a:pos x="connsiteX1" y="connsiteY1"/>
+              </a:cxn>
+              <a:cxn ang="0">
+                <a:pos x="connsiteX2" y="connsiteY2"/>
+              </a:cxn>
+              <a:cxn ang="0">
+                <a:pos x="connsiteX3" y="connsiteY3"/>
+              </a:cxn>
+            </a:cxnLst>
+            <a:rect l="l" t="t" r="r" b="b"/>
+            <a:pathLst>
+              <a:path w="11786754" h="6858000">
+                <a:moveTo>
+                  <a:pt x="0" y="0"/>
+                </a:moveTo>
+                <a:lnTo>
+                  <a:pt x="8610600" y="0"/>
+                </a:lnTo>
+                <a:lnTo>
+                  <a:pt x="11786754" y="6858000"/>
+                </a:lnTo>
+                <a:lnTo>
+                  <a:pt x="0" y="6858000"/>
+                </a:lnTo>
+                <a:close/>
+              </a:path>
+            </a:pathLst>
+          </a:custGeom>
+          <a:solidFill>
+            <a:srgbClr val="000000">
+              <a:alpha val="29804"/>
+            </a:srgbClr>
+          </a:solidFill>
+          <a:ln>
+            <a:noFill/>
+          </a:ln>
+        </p:spPr>
+        <p:style>
+          <a:lnRef idx="2">
+            <a:schemeClr val="accent1">
+              <a:shade val="50000"/>
+            </a:schemeClr>
+          </a:lnRef>
+          <a:fillRef idx="1">
+            <a:schemeClr val="accent1"/>
+          </a:fillRef>
+          <a:effectRef idx="0">
+            <a:schemeClr val="accent1"/>
+          </a:effectRef>
+          <a:fontRef idx="minor">
+            <a:schemeClr val="lt1"/>
+          </a:fontRef>
+        </p:style>
+        <p:txBody>
+          <a:bodyPr rtlCol="0" anchor="ctr"/>
+          <a:lstStyle/>
+          <a:p>
+            <a:pPr marL="0" marR="0" lvl="0" indent="0" algn="ctr" defTabSz="914400" rtl="0" eaLnBrk="1" fontAlgn="auto" latinLnBrk="0" hangingPunct="1">
+              <a:lnSpc>
+                <a:spcPct val="100000"/>
+              </a:lnSpc>
+              <a:spcBef>
+                <a:spcPts val="0"/>
+              </a:spcBef>
+              <a:spcAft>
+                <a:spcPts val="0"/>
+              </a:spcAft>
+              <a:buClrTx/>
+              <a:buSzTx/>
+              <a:buFontTx/>
+              <a:buNone/>
+              <a:tabLst/>
+              <a:defRPr/>
+            </a:pPr>
+            <a:endParaRPr kumimoji="0" lang="en-US" sz="1800" b="0" i="0" u="none" strike="noStrike" kern="1200" cap="none" spc="0" normalizeH="0" baseline="0" noProof="0">
+              <a:ln>
+                <a:noFill/>
+              </a:ln>
+              <a:solidFill>
+                <a:prstClr val="white"/>
+              </a:solidFill>
+              <a:effectLst/>
+              <a:uLnTx/>
+              <a:uFillTx/>
+              <a:latin typeface="Calibri" panose="020F0502020204030204"/>
+              <a:ea typeface="+mn-ea"/>
+              <a:cs typeface="+mn-cs"/>
+            </a:endParaRPr>
+          </a:p>
+        </p:txBody>
+      </p:sp>
+      <p:sp>
+        <p:nvSpPr>
+          <p:cNvPr id="12" name="Freeform: Shape 11">
+            <a:extLst>
+              <a:ext uri="{FF2B5EF4-FFF2-40B4-BE49-F238E27FC236}">
+                <a16:creationId xmlns:a16="http://schemas.microsoft.com/office/drawing/2014/main" id="{9FA64B84-CE2D-4179-B018-A71AC174C71C}"/>
+              </a:ext>
+              <a:ext uri="{C183D7F6-B498-43B3-948B-1728B52AA6E4}">
+                <adec:decorative xmlns:adec="http://schemas.microsoft.com/office/drawing/2017/decorative" val="1"/>
+              </a:ext>
+            </a:extLst>
+          </p:cNvPr>
+          <p:cNvSpPr>
+            <a:spLocks noGrp="1" noRot="1" noChangeAspect="1" noMove="1" noResize="1" noEditPoints="1" noAdjustHandles="1" noChangeArrowheads="1" noChangeShapeType="1" noTextEdit="1"/>
+          </p:cNvSpPr>
+          <p:nvPr>
+            <p:extLst>
+              <p:ext uri="{386F3935-93C4-4BCD-93E2-E3B085C9AB24}">
+                <p16:designElem xmlns:p16="http://schemas.microsoft.com/office/powerpoint/2015/main" val="1"/>
+              </p:ext>
+            </p:extLst>
+          </p:nvPr>
+        </p:nvSpPr>
+        <p:spPr>
+          <a:xfrm>
+            <a:off x="0" y="0"/>
+            <a:ext cx="3459632" cy="6858000"/>
+          </a:xfrm>
+          <a:custGeom>
+            <a:avLst/>
+            <a:gdLst>
+              <a:gd name="connsiteX0" fmla="*/ 0 w 3459632"/>
+              <a:gd name="connsiteY0" fmla="*/ 0 h 6858000"/>
+              <a:gd name="connsiteX1" fmla="*/ 283478 w 3459632"/>
+              <a:gd name="connsiteY1" fmla="*/ 0 h 6858000"/>
+              <a:gd name="connsiteX2" fmla="*/ 3459632 w 3459632"/>
+              <a:gd name="connsiteY2" fmla="*/ 6858000 h 6858000"/>
+              <a:gd name="connsiteX3" fmla="*/ 0 w 3459632"/>
+              <a:gd name="connsiteY3" fmla="*/ 6858000 h 6858000"/>
+            </a:gdLst>
+            <a:ahLst/>
+            <a:cxnLst>
+              <a:cxn ang="0">
+                <a:pos x="connsiteX0" y="connsiteY0"/>
+              </a:cxn>
+              <a:cxn ang="0">
+                <a:pos x="connsiteX1" y="connsiteY1"/>
+              </a:cxn>
+              <a:cxn ang="0">
+                <a:pos x="connsiteX2" y="connsiteY2"/>
+              </a:cxn>
+              <a:cxn ang="0">
+                <a:pos x="connsiteX3" y="connsiteY3"/>
+              </a:cxn>
+            </a:cxnLst>
+            <a:rect l="l" t="t" r="r" b="b"/>
+            <a:pathLst>
+              <a:path w="3459632" h="6858000">
+                <a:moveTo>
+                  <a:pt x="0" y="0"/>
+                </a:moveTo>
+                <a:lnTo>
+                  <a:pt x="283478" y="0"/>
+                </a:lnTo>
+                <a:lnTo>
+                  <a:pt x="3459632" y="6858000"/>
+                </a:lnTo>
+                <a:lnTo>
+                  <a:pt x="0" y="6858000"/>
+                </a:lnTo>
+                <a:close/>
+              </a:path>
+            </a:pathLst>
+          </a:custGeom>
+          <a:solidFill>
+            <a:srgbClr val="000000">
+              <a:alpha val="29804"/>
+            </a:srgbClr>
+          </a:solidFill>
+          <a:ln>
+            <a:noFill/>
+          </a:ln>
+        </p:spPr>
+        <p:style>
+          <a:lnRef idx="2">
+            <a:schemeClr val="accent1">
+              <a:shade val="50000"/>
+            </a:schemeClr>
+          </a:lnRef>
+          <a:fillRef idx="1">
+            <a:schemeClr val="accent1"/>
+          </a:fillRef>
+          <a:effectRef idx="0">
+            <a:schemeClr val="accent1"/>
+          </a:effectRef>
+          <a:fontRef idx="minor">
+            <a:schemeClr val="lt1"/>
+          </a:fontRef>
+        </p:style>
+        <p:txBody>
+          <a:bodyPr wrap="square" rtlCol="0" anchor="ctr">
+            <a:noAutofit/>
+          </a:bodyPr>
+          <a:lstStyle/>
+          <a:p>
+            <a:pPr marL="0" marR="0" lvl="0" indent="0" algn="ctr" defTabSz="914400" rtl="0" eaLnBrk="1" fontAlgn="auto" latinLnBrk="0" hangingPunct="1">
+              <a:lnSpc>
+                <a:spcPct val="100000"/>
+              </a:lnSpc>
+              <a:spcBef>
+                <a:spcPts val="0"/>
+              </a:spcBef>
+              <a:spcAft>
+                <a:spcPts val="0"/>
+              </a:spcAft>
+              <a:buClrTx/>
+              <a:buSzTx/>
+              <a:buFontTx/>
+              <a:buNone/>
+              <a:tabLst/>
+              <a:defRPr/>
+            </a:pPr>
+            <a:endParaRPr kumimoji="0" lang="en-US" sz="1800" b="0" i="0" u="none" strike="noStrike" kern="1200" cap="none" spc="0" normalizeH="0" baseline="0" noProof="0">
+              <a:ln>
+                <a:noFill/>
+              </a:ln>
+              <a:solidFill>
+                <a:prstClr val="white"/>
+              </a:solidFill>
+              <a:effectLst/>
+              <a:uLnTx/>
+              <a:uFillTx/>
+              <a:latin typeface="Calibri" panose="020F0502020204030204"/>
+              <a:ea typeface="+mn-ea"/>
+              <a:cs typeface="+mn-cs"/>
+            </a:endParaRPr>
+          </a:p>
+        </p:txBody>
+      </p:sp>
+      <p:sp>
+        <p:nvSpPr>
+          <p:cNvPr id="2" name="Title 1">
+            <a:extLst>
+              <a:ext uri="{FF2B5EF4-FFF2-40B4-BE49-F238E27FC236}">
+                <a16:creationId xmlns:a16="http://schemas.microsoft.com/office/drawing/2014/main" id="{6599601C-081B-4C5C-99AD-A3BC432AE29C}"/>
+              </a:ext>
+            </a:extLst>
+          </p:cNvPr>
+          <p:cNvSpPr>
+            <a:spLocks noGrp="1"/>
+          </p:cNvSpPr>
+          <p:nvPr>
+            <p:ph type="title"/>
+          </p:nvPr>
+        </p:nvSpPr>
+        <p:spPr>
+          <a:xfrm>
+            <a:off x="3111963" y="0"/>
+            <a:ext cx="5968074" cy="949593"/>
+          </a:xfrm>
+        </p:spPr>
+        <p:txBody>
+          <a:bodyPr>
+            <a:normAutofit/>
+          </a:bodyPr>
+          <a:lstStyle/>
+          <a:p>
+            <a:r>
+              <a:rPr lang="en-IN" dirty="0">
+                <a:solidFill>
+                  <a:srgbClr val="FFFFFF"/>
+                </a:solidFill>
+              </a:rPr>
+              <a:t>Async / Await</a:t>
+            </a:r>
+          </a:p>
+        </p:txBody>
+      </p:sp>
+      <p:sp>
+        <p:nvSpPr>
+          <p:cNvPr id="14" name="TextBox 13">
+            <a:extLst>
+              <a:ext uri="{FF2B5EF4-FFF2-40B4-BE49-F238E27FC236}">
+                <a16:creationId xmlns:a16="http://schemas.microsoft.com/office/drawing/2014/main" id="{4795A2E2-224B-4FA0-B323-9E61AD30697F}"/>
+              </a:ext>
+              <a:ext uri="{C183D7F6-B498-43B3-948B-1728B52AA6E4}">
+                <adec:decorative xmlns:adec="http://schemas.microsoft.com/office/drawing/2017/decorative" val="1"/>
+              </a:ext>
+            </a:extLst>
+          </p:cNvPr>
+          <p:cNvSpPr txBox="1">
+            <a:spLocks noGrp="1" noRot="1" noChangeAspect="1" noMove="1" noResize="1" noEditPoints="1" noAdjustHandles="1" noChangeArrowheads="1" noChangeShapeType="1" noTextEdit="1"/>
+          </p:cNvSpPr>
+          <p:nvPr>
+            <p:extLst>
+              <p:ext uri="{386F3935-93C4-4BCD-93E2-E3B085C9AB24}">
+                <p16:designElem xmlns:p16="http://schemas.microsoft.com/office/powerpoint/2015/main" val="1"/>
+              </p:ext>
+            </p:extLst>
+          </p:nvPr>
+        </p:nvSpPr>
+        <p:spPr>
+          <a:xfrm>
+            <a:off x="833002" y="1870075"/>
+            <a:ext cx="9612178" cy="595651"/>
+          </a:xfrm>
+          <a:prstGeom prst="rect">
+            <a:avLst/>
+          </a:prstGeom>
+          <a:noFill/>
+        </p:spPr>
+        <p:txBody>
+          <a:bodyPr wrap="square" rtlCol="0" anchor="t">
+            <a:normAutofit/>
+          </a:bodyPr>
+          <a:lstStyle/>
+          <a:p>
+            <a:pPr marL="0" marR="0" lvl="0" indent="0" algn="l" defTabSz="914400" rtl="0" eaLnBrk="1" fontAlgn="auto" latinLnBrk="0" hangingPunct="1">
+              <a:lnSpc>
+                <a:spcPct val="120000"/>
+              </a:lnSpc>
+              <a:spcBef>
+                <a:spcPts val="0"/>
+              </a:spcBef>
+              <a:spcAft>
+                <a:spcPts val="0"/>
+              </a:spcAft>
+              <a:buClrTx/>
+              <a:buSzTx/>
+              <a:buFontTx/>
+              <a:buNone/>
+              <a:tabLst/>
+              <a:defRPr/>
+            </a:pPr>
+            <a:endParaRPr kumimoji="0" lang="en-US" sz="2000" b="0" i="0" u="none" strike="noStrike" kern="1200" cap="none" spc="0" normalizeH="0" baseline="0" noProof="0" dirty="0">
+              <a:ln>
+                <a:noFill/>
+              </a:ln>
+              <a:solidFill>
+                <a:srgbClr val="FFC000"/>
+              </a:solidFill>
+              <a:effectLst/>
+              <a:uLnTx/>
+              <a:uFillTx/>
+              <a:latin typeface="Calibri" panose="020F0502020204030204"/>
+              <a:ea typeface="+mn-ea"/>
+              <a:cs typeface="+mn-cs"/>
+            </a:endParaRPr>
+          </a:p>
+        </p:txBody>
+      </p:sp>
+      <p:sp>
+        <p:nvSpPr>
+          <p:cNvPr id="3" name="Content Placeholder 2">
+            <a:extLst>
+              <a:ext uri="{FF2B5EF4-FFF2-40B4-BE49-F238E27FC236}">
+                <a16:creationId xmlns:a16="http://schemas.microsoft.com/office/drawing/2014/main" id="{37F319FF-7163-4F0F-AB17-3B32BC09CC75}"/>
+              </a:ext>
+            </a:extLst>
+          </p:cNvPr>
+          <p:cNvSpPr>
+            <a:spLocks noGrp="1"/>
+          </p:cNvSpPr>
+          <p:nvPr>
+            <p:ph idx="1"/>
+          </p:nvPr>
+        </p:nvSpPr>
+        <p:spPr>
+          <a:xfrm>
+            <a:off x="1746820" y="1787792"/>
+            <a:ext cx="7331769" cy="4784457"/>
+          </a:xfrm>
+        </p:spPr>
+        <p:txBody>
+          <a:bodyPr>
+            <a:normAutofit/>
+          </a:bodyPr>
+          <a:lstStyle/>
+          <a:p>
+            <a:pPr marL="0" indent="0">
+              <a:buNone/>
+            </a:pPr>
+            <a:endParaRPr lang="en-IN" sz="1800" dirty="0">
+              <a:solidFill>
+                <a:srgbClr val="FFFFFF"/>
+              </a:solidFill>
+            </a:endParaRPr>
+          </a:p>
+          <a:p>
+            <a:r>
+              <a:rPr lang="en-US" sz="1800" i="1" dirty="0"/>
+              <a:t>Async / Await facilitates us by letting us write asynchronous code in synchronous way</a:t>
+            </a:r>
+          </a:p>
+          <a:p>
+            <a:r>
+              <a:rPr lang="en-IN" sz="1800" dirty="0">
+                <a:solidFill>
+                  <a:srgbClr val="FFFFFF"/>
+                </a:solidFill>
+              </a:rPr>
+              <a:t>A function need to be labelled async in order to use await inside </a:t>
+            </a:r>
+          </a:p>
+          <a:p>
+            <a:r>
+              <a:rPr lang="en-IN" sz="1800" dirty="0">
+                <a:solidFill>
+                  <a:srgbClr val="FFFFFF"/>
+                </a:solidFill>
+              </a:rPr>
+              <a:t>Its basically a more elegant way to handle promises</a:t>
+            </a:r>
+          </a:p>
+          <a:p>
+            <a:endParaRPr lang="en-IN" sz="1800" dirty="0">
+              <a:solidFill>
+                <a:srgbClr val="FFFFFF"/>
+              </a:solidFill>
+            </a:endParaRPr>
+          </a:p>
+          <a:p>
+            <a:endParaRPr lang="en-IN" sz="1800" dirty="0">
+              <a:solidFill>
+                <a:srgbClr val="FFFFFF"/>
+              </a:solidFill>
+            </a:endParaRPr>
+          </a:p>
+          <a:p>
+            <a:endParaRPr lang="en-IN" sz="1800" dirty="0">
+              <a:solidFill>
+                <a:srgbClr val="FFFFFF"/>
+              </a:solidFill>
+            </a:endParaRPr>
+          </a:p>
+        </p:txBody>
+      </p:sp>
+    </p:spTree>
+    <p:extLst>
+      <p:ext uri="{BB962C8B-B14F-4D97-AF65-F5344CB8AC3E}">
+        <p14:creationId xmlns:p14="http://schemas.microsoft.com/office/powerpoint/2010/main" val="282016303"/>
+      </p:ext>
+    </p:extLst>
+  </p:cSld>
+  <p:clrMapOvr>
+    <a:overrideClrMapping bg1="dk1" tx1="lt1" bg2="dk2" tx2="lt2" accent1="accent1" accent2="accent2" accent3="accent3" accent4="accent4" accent5="accent5" accent6="accent6" hlink="hlink" folHlink="folHlink"/>
   </p:clrMapOvr>
 </p:sld>
 </file>

</xml_diff>